<commit_message>
Added final report and presentation
</commit_message>
<xml_diff>
--- a/Final Project Presentation.pptx
+++ b/Final Project Presentation.pptx
@@ -6076,15 +6076,15 @@
 <file path=customXml/itemProps2.xml><?xml version="1.0" encoding="utf-8"?>
 <ds:datastoreItem xmlns:ds="http://schemas.openxmlformats.org/officeDocument/2006/customXml" ds:itemID="{0BFEC68E-2937-4D14-9A1E-17AB6676E675}">
   <ds:schemaRefs>
+    <ds:schemaRef ds:uri="http://purl.org/dc/elements/1.1/"/>
     <ds:schemaRef ds:uri="http://schemas.microsoft.com/office/2006/documentManagement/types"/>
+    <ds:schemaRef ds:uri="http://schemas.openxmlformats.org/package/2006/metadata/core-properties"/>
     <ds:schemaRef ds:uri="http://www.w3.org/XML/1998/namespace"/>
-    <ds:schemaRef ds:uri="http://schemas.openxmlformats.org/package/2006/metadata/core-properties"/>
-    <ds:schemaRef ds:uri="http://purl.org/dc/elements/1.1/"/>
+    <ds:schemaRef ds:uri="http://purl.org/dc/dcmitype/"/>
+    <ds:schemaRef ds:uri="http://schemas.microsoft.com/office/2006/metadata/properties"/>
+    <ds:schemaRef ds:uri="http://schemas.microsoft.com/office/infopath/2007/PartnerControls"/>
+    <ds:schemaRef ds:uri="6d33f078-875a-4769-b2f9-3934b62a2b18"/>
     <ds:schemaRef ds:uri="http://purl.org/dc/terms/"/>
-    <ds:schemaRef ds:uri="6d33f078-875a-4769-b2f9-3934b62a2b18"/>
-    <ds:schemaRef ds:uri="http://schemas.microsoft.com/office/infopath/2007/PartnerControls"/>
-    <ds:schemaRef ds:uri="http://schemas.microsoft.com/office/2006/metadata/properties"/>
-    <ds:schemaRef ds:uri="http://purl.org/dc/dcmitype/"/>
   </ds:schemaRefs>
 </ds:datastoreItem>
 </file>

</xml_diff>